<commit_message>
Modifiche slide ed Img.
</commit_message>
<xml_diff>
--- a/Presentazione/Presentazione - FINALE.pptx
+++ b/Presentazione/Presentazione - FINALE.pptx
@@ -140,7 +140,7 @@
   </p:defaultTextStyle>
   <p:extLst>
     <p:ext uri="{521415D9-36F7-43E2-AB2F-B90AF26B5E84}">
-      <p14:sectionLst xmlns:p14="http://schemas.microsoft.com/office/powerpoint/2010/main" xmlns="">
+      <p14:sectionLst xmlns="" xmlns:p14="http://schemas.microsoft.com/office/powerpoint/2010/main">
         <p14:section name="Giulio" id="{8A68DBB2-702F-4DF3-9281-E76EF3A1D481}">
           <p14:sldIdLst>
             <p14:sldId id="256"/>
@@ -190,7 +190,7 @@
       </p14:sectionLst>
     </p:ext>
     <p:ext uri="{EFAFB233-063F-42B5-8137-9DF3F51BA10A}">
-      <p15:sldGuideLst xmlns:p15="http://schemas.microsoft.com/office/powerpoint/2012/main" xmlns=""/>
+      <p15:sldGuideLst xmlns="" xmlns:p15="http://schemas.microsoft.com/office/powerpoint/2012/main"/>
     </p:ext>
   </p:extLst>
 </p:presentation>
@@ -448,7 +448,7 @@
     </p:spTree>
     <p:extLst>
       <p:ext uri="{BB962C8B-B14F-4D97-AF65-F5344CB8AC3E}">
-        <p14:creationId xmlns:p14="http://schemas.microsoft.com/office/powerpoint/2010/main" xmlns="" val="2137693661"/>
+        <p14:creationId xmlns="" xmlns:p14="http://schemas.microsoft.com/office/powerpoint/2010/main" val="2137693661"/>
       </p:ext>
     </p:extLst>
   </p:cSld>
@@ -633,7 +633,7 @@
     </p:spTree>
     <p:extLst>
       <p:ext uri="{BB962C8B-B14F-4D97-AF65-F5344CB8AC3E}">
-        <p14:creationId xmlns:p14="http://schemas.microsoft.com/office/powerpoint/2010/main" xmlns="" val="3867592314"/>
+        <p14:creationId xmlns="" xmlns:p14="http://schemas.microsoft.com/office/powerpoint/2010/main" val="3867592314"/>
       </p:ext>
     </p:extLst>
   </p:cSld>
@@ -886,7 +886,7 @@
     </p:spTree>
     <p:extLst>
       <p:ext uri="{BB962C8B-B14F-4D97-AF65-F5344CB8AC3E}">
-        <p14:creationId xmlns:p14="http://schemas.microsoft.com/office/powerpoint/2010/main" xmlns="" val="193306816"/>
+        <p14:creationId xmlns="" xmlns:p14="http://schemas.microsoft.com/office/powerpoint/2010/main" val="193306816"/>
       </p:ext>
     </p:extLst>
   </p:cSld>
@@ -4088,7 +4088,7 @@
     </p:spTree>
     <p:extLst>
       <p:ext uri="{BB962C8B-B14F-4D97-AF65-F5344CB8AC3E}">
-        <p14:creationId xmlns:p14="http://schemas.microsoft.com/office/powerpoint/2010/main" xmlns="" val="587293541"/>
+        <p14:creationId xmlns="" xmlns:p14="http://schemas.microsoft.com/office/powerpoint/2010/main" val="587293541"/>
       </p:ext>
     </p:extLst>
   </p:cSld>
@@ -4481,7 +4481,7 @@
     </p:spTree>
     <p:extLst>
       <p:ext uri="{BB962C8B-B14F-4D97-AF65-F5344CB8AC3E}">
-        <p14:creationId xmlns:p14="http://schemas.microsoft.com/office/powerpoint/2010/main" xmlns="" val="1849551949"/>
+        <p14:creationId xmlns="" xmlns:p14="http://schemas.microsoft.com/office/powerpoint/2010/main" val="1849551949"/>
       </p:ext>
     </p:extLst>
   </p:cSld>
@@ -4660,7 +4660,7 @@
       </p:sp>
       <p:pic>
         <p:nvPicPr>
-          <p:cNvPr id="5" name="Immagine 4" descr="EventList.png"/>
+          <p:cNvPr id="6" name="Immagine 5" descr="EventList.png"/>
           <p:cNvPicPr>
             <a:picLocks noChangeAspect="1"/>
           </p:cNvPicPr>
@@ -4674,8 +4674,8 @@
         </p:blipFill>
         <p:spPr>
           <a:xfrm>
-            <a:off x="3525407" y="2322268"/>
-            <a:ext cx="8666593" cy="1458162"/>
+            <a:off x="3593764" y="2210937"/>
+            <a:ext cx="8598236" cy="1446661"/>
           </a:xfrm>
           <a:prstGeom prst="rect">
             <a:avLst/>
@@ -4685,7 +4685,7 @@
     </p:spTree>
     <p:extLst>
       <p:ext uri="{BB962C8B-B14F-4D97-AF65-F5344CB8AC3E}">
-        <p14:creationId xmlns:p14="http://schemas.microsoft.com/office/powerpoint/2010/main" xmlns="" val="4290144304"/>
+        <p14:creationId xmlns="" xmlns:p14="http://schemas.microsoft.com/office/powerpoint/2010/main" val="4290144304"/>
       </p:ext>
     </p:extLst>
   </p:cSld>
@@ -4987,7 +4987,7 @@
           <a:blip r:embed="rId3">
             <a:extLst>
               <a:ext uri="{28A0092B-C50C-407E-A947-70E740481C1C}">
-                <a14:useLocalDpi xmlns:a14="http://schemas.microsoft.com/office/drawing/2010/main" xmlns="" val="0"/>
+                <a14:useLocalDpi xmlns="" xmlns:a14="http://schemas.microsoft.com/office/drawing/2010/main" val="0"/>
               </a:ext>
             </a:extLst>
           </a:blip>
@@ -5032,7 +5032,7 @@
           </a:sp3d>
           <a:extLst>
             <a:ext uri="{AF507438-7753-43E0-B8FC-AC1667EBCBE1}">
-              <a14:hiddenEffects xmlns:a14="http://schemas.microsoft.com/office/drawing/2010/main" xmlns="">
+              <a14:hiddenEffects xmlns="" xmlns:a14="http://schemas.microsoft.com/office/drawing/2010/main">
                 <a:effectLst>
                   <a:outerShdw dist="35921" dir="2700000" algn="ctr" rotWithShape="0">
                     <a:srgbClr val="EEECE1"/>
@@ -5071,12 +5071,12 @@
           <a:effectLst/>
           <a:extLst>
             <a:ext uri="{909E8E84-426E-40DD-AFC4-6F175D3DCCD1}">
-              <a14:hiddenFill xmlns:a14="http://schemas.microsoft.com/office/drawing/2010/main" xmlns="">
+              <a14:hiddenFill xmlns="" xmlns:a14="http://schemas.microsoft.com/office/drawing/2010/main">
                 <a:noFill/>
               </a14:hiddenFill>
             </a:ext>
             <a:ext uri="{AF507438-7753-43E0-B8FC-AC1667EBCBE1}">
-              <a14:hiddenEffects xmlns:a14="http://schemas.microsoft.com/office/drawing/2010/main" xmlns="">
+              <a14:hiddenEffects xmlns="" xmlns:a14="http://schemas.microsoft.com/office/drawing/2010/main">
                 <a:effectLst>
                   <a:outerShdw dist="35921" dir="2700000" algn="ctr" rotWithShape="0">
                     <a:srgbClr val="EEECE1"/>
@@ -5515,7 +5515,7 @@
     </p:spTree>
     <p:extLst>
       <p:ext uri="{BB962C8B-B14F-4D97-AF65-F5344CB8AC3E}">
-        <p14:creationId xmlns:p14="http://schemas.microsoft.com/office/powerpoint/2010/main" xmlns="" val="440623707"/>
+        <p14:creationId xmlns="" xmlns:p14="http://schemas.microsoft.com/office/powerpoint/2010/main" val="440623707"/>
       </p:ext>
     </p:extLst>
   </p:cSld>
@@ -6280,7 +6280,7 @@
           <a:blip r:embed="rId3">
             <a:extLst>
               <a:ext uri="{28A0092B-C50C-407E-A947-70E740481C1C}">
-                <a14:useLocalDpi xmlns:a14="http://schemas.microsoft.com/office/drawing/2010/main" xmlns="" val="0"/>
+                <a14:useLocalDpi xmlns="" xmlns:a14="http://schemas.microsoft.com/office/drawing/2010/main" val="0"/>
               </a:ext>
             </a:extLst>
           </a:blip>
@@ -6336,7 +6336,7 @@
           <a:blip r:embed="rId4">
             <a:extLst>
               <a:ext uri="{28A0092B-C50C-407E-A947-70E740481C1C}">
-                <a14:useLocalDpi xmlns:a14="http://schemas.microsoft.com/office/drawing/2010/main" xmlns="" val="0"/>
+                <a14:useLocalDpi xmlns="" xmlns:a14="http://schemas.microsoft.com/office/drawing/2010/main" val="0"/>
               </a:ext>
             </a:extLst>
           </a:blip>
@@ -6383,7 +6383,7 @@
     </p:spTree>
     <p:extLst>
       <p:ext uri="{BB962C8B-B14F-4D97-AF65-F5344CB8AC3E}">
-        <p14:creationId xmlns:p14="http://schemas.microsoft.com/office/powerpoint/2010/main" xmlns="" val="4005470968"/>
+        <p14:creationId xmlns="" xmlns:p14="http://schemas.microsoft.com/office/powerpoint/2010/main" val="4005470968"/>
       </p:ext>
     </p:extLst>
   </p:cSld>
@@ -7371,7 +7371,7 @@
     </p:spTree>
     <p:extLst>
       <p:ext uri="{BB962C8B-B14F-4D97-AF65-F5344CB8AC3E}">
-        <p14:creationId xmlns:p14="http://schemas.microsoft.com/office/powerpoint/2010/main" xmlns="" val="601794155"/>
+        <p14:creationId xmlns="" xmlns:p14="http://schemas.microsoft.com/office/powerpoint/2010/main" val="601794155"/>
       </p:ext>
     </p:extLst>
   </p:cSld>
@@ -7379,7 +7379,7 @@
     <a:masterClrMapping/>
   </p:clrMapOvr>
   <mc:AlternateContent xmlns:mc="http://schemas.openxmlformats.org/markup-compatibility/2006">
-    <mc:Choice xmlns:p14="http://schemas.microsoft.com/office/powerpoint/2010/main" xmlns="" Requires="p14">
+    <mc:Choice xmlns="" xmlns:p14="http://schemas.microsoft.com/office/powerpoint/2010/main" Requires="p14">
       <p:transition spd="slow" p14:dur="1600">
         <p14:prism dir="u" isContent="1" isInverted="1"/>
       </p:transition>
@@ -8392,11 +8392,7 @@
             </a:pPr>
             <a:r>
               <a:rPr lang="it-IT" sz="2200" dirty="0" smtClean="0"/>
-              <a:t>Aumento del numero di Client dovuto </a:t>
-            </a:r>
-            <a:r>
-              <a:rPr lang="it-IT" sz="2200" dirty="0" smtClean="0"/>
-              <a:t> al </a:t>
+              <a:t>Aumento del numero di Client dovuto  al </a:t>
             </a:r>
             <a:r>
               <a:rPr lang="it-IT" sz="2200" b="1" dirty="0" err="1" smtClean="0"/>
@@ -8508,7 +8504,7 @@
     </p:spTree>
     <p:extLst>
       <p:ext uri="{BB962C8B-B14F-4D97-AF65-F5344CB8AC3E}">
-        <p14:creationId xmlns:p14="http://schemas.microsoft.com/office/powerpoint/2010/main" xmlns="" val="1419481257"/>
+        <p14:creationId xmlns="" xmlns:p14="http://schemas.microsoft.com/office/powerpoint/2010/main" val="1419481257"/>
       </p:ext>
     </p:extLst>
   </p:cSld>
@@ -9764,70 +9760,6 @@
           </a:graphicData>
         </a:graphic>
       </p:graphicFrame>
-      <p:pic>
-        <p:nvPicPr>
-          <p:cNvPr id="13" name="Segnaposto contenuto 7" descr="reteJackson.png"/>
-          <p:cNvPicPr>
-            <a:picLocks noChangeAspect="1"/>
-          </p:cNvPicPr>
-          <p:nvPr/>
-        </p:nvPicPr>
-        <p:blipFill>
-          <a:blip r:embed="rId13"/>
-          <a:stretch>
-            <a:fillRect/>
-          </a:stretch>
-        </p:blipFill>
-        <p:spPr>
-          <a:xfrm>
-            <a:off x="208091" y="1141807"/>
-            <a:ext cx="11569928" cy="2952522"/>
-          </a:xfrm>
-          <a:prstGeom prst="rect">
-            <a:avLst/>
-          </a:prstGeom>
-          <a:ln>
-            <a:noFill/>
-          </a:ln>
-          <a:effectLst>
-            <a:outerShdw blurRad="292100" dist="139700" dir="2700000" algn="tl" rotWithShape="0">
-              <a:srgbClr val="333333">
-                <a:alpha val="65000"/>
-              </a:srgbClr>
-            </a:outerShdw>
-          </a:effectLst>
-        </p:spPr>
-      </p:pic>
-      <p:pic>
-        <p:nvPicPr>
-          <p:cNvPr id="14" name="Immagine 13"/>
-          <p:cNvPicPr>
-            <a:picLocks noChangeAspect="1"/>
-          </p:cNvPicPr>
-          <p:nvPr/>
-        </p:nvPicPr>
-        <p:blipFill>
-          <a:blip r:embed="rId14">
-            <a:extLst>
-              <a:ext uri="{28A0092B-C50C-407E-A947-70E740481C1C}">
-                <a14:useLocalDpi xmlns="" xmlns:a14="http://schemas.microsoft.com/office/drawing/2010/main" val="0"/>
-              </a:ext>
-            </a:extLst>
-          </a:blip>
-          <a:stretch>
-            <a:fillRect/>
-          </a:stretch>
-        </p:blipFill>
-        <p:spPr>
-          <a:xfrm>
-            <a:off x="3250305" y="1312637"/>
-            <a:ext cx="3437095" cy="1294086"/>
-          </a:xfrm>
-          <a:prstGeom prst="rect">
-            <a:avLst/>
-          </a:prstGeom>
-        </p:spPr>
-      </p:pic>
       <p:graphicFrame>
         <p:nvGraphicFramePr>
           <p:cNvPr id="15" name="Oggetto 14"/>
@@ -9842,7 +9774,7 @@
         </p:xfrm>
         <a:graphic>
           <a:graphicData uri="http://schemas.openxmlformats.org/presentationml/2006/ole">
-            <p:oleObj spid="_x0000_s123916" name="Equazione" r:id="rId15" imgW="1091880" imgH="177480" progId="Equation.3">
+            <p:oleObj spid="_x0000_s123916" name="Equazione" r:id="rId13" imgW="1091880" imgH="177480" progId="Equation.3">
               <p:embed/>
             </p:oleObj>
           </a:graphicData>
@@ -9862,7 +9794,7 @@
         </p:xfrm>
         <a:graphic>
           <a:graphicData uri="http://schemas.openxmlformats.org/presentationml/2006/ole">
-            <p:oleObj spid="_x0000_s123917" name="Equazione" r:id="rId16" imgW="2869920" imgH="419040" progId="Equation.3">
+            <p:oleObj spid="_x0000_s123917" name="Equazione" r:id="rId14" imgW="2869920" imgH="419040" progId="Equation.3">
               <p:embed/>
             </p:oleObj>
           </a:graphicData>
@@ -9931,12 +9863,66 @@
         </p:xfrm>
         <a:graphic>
           <a:graphicData uri="http://schemas.openxmlformats.org/presentationml/2006/ole">
-            <p:oleObj spid="_x0000_s123918" name="Equazione" r:id="rId17" imgW="736560" imgH="177480" progId="Equation.3">
+            <p:oleObj spid="_x0000_s123918" name="Equazione" r:id="rId15" imgW="736560" imgH="177480" progId="Equation.3">
               <p:embed/>
             </p:oleObj>
           </a:graphicData>
         </a:graphic>
       </p:graphicFrame>
+      <p:pic>
+        <p:nvPicPr>
+          <p:cNvPr id="21" name="Immagine 20" descr="reteJackson.png"/>
+          <p:cNvPicPr>
+            <a:picLocks noChangeAspect="1"/>
+          </p:cNvPicPr>
+          <p:nvPr/>
+        </p:nvPicPr>
+        <p:blipFill>
+          <a:blip r:embed="rId16"/>
+          <a:stretch>
+            <a:fillRect/>
+          </a:stretch>
+        </p:blipFill>
+        <p:spPr>
+          <a:xfrm>
+            <a:off x="-182627" y="846162"/>
+            <a:ext cx="14172450" cy="3616657"/>
+          </a:xfrm>
+          <a:prstGeom prst="rect">
+            <a:avLst/>
+          </a:prstGeom>
+        </p:spPr>
+      </p:pic>
+      <p:pic>
+        <p:nvPicPr>
+          <p:cNvPr id="14" name="Immagine 13"/>
+          <p:cNvPicPr>
+            <a:picLocks noChangeAspect="1"/>
+          </p:cNvPicPr>
+          <p:nvPr/>
+        </p:nvPicPr>
+        <p:blipFill>
+          <a:blip r:embed="rId17">
+            <a:extLst>
+              <a:ext uri="{28A0092B-C50C-407E-A947-70E740481C1C}">
+                <a14:useLocalDpi xmlns:a14="http://schemas.microsoft.com/office/drawing/2010/main" xmlns="" val="0"/>
+              </a:ext>
+            </a:extLst>
+          </a:blip>
+          <a:stretch>
+            <a:fillRect/>
+          </a:stretch>
+        </p:blipFill>
+        <p:spPr>
+          <a:xfrm>
+            <a:off x="3125336" y="1016201"/>
+            <a:ext cx="4358185" cy="1640882"/>
+          </a:xfrm>
+          <a:prstGeom prst="rect">
+            <a:avLst/>
+          </a:prstGeom>
+        </p:spPr>
+      </p:pic>
     </p:spTree>
   </p:cSld>
   <p:clrMapOvr>
@@ -10177,7 +10163,6 @@
               <a:rPr lang="it-IT" i="1" dirty="0" smtClean="0"/>
               <a:t>(0.1) </a:t>
             </a:r>
-            <a:endParaRPr lang="it-IT" i="1" dirty="0" smtClean="0"/>
           </a:p>
           <a:p>
             <a:endParaRPr lang="it-IT" dirty="0" smtClean="0"/>
@@ -10197,11 +10182,7 @@
           <a:p>
             <a:r>
               <a:rPr lang="it-IT" dirty="0" smtClean="0"/>
-              <a:t>Generare </a:t>
-            </a:r>
-            <a:r>
-              <a:rPr lang="it-IT" dirty="0" smtClean="0"/>
-              <a:t>un campione attraverso ripetute chiamate  al generatore </a:t>
+              <a:t>Generare un campione attraverso ripetute chiamate  al generatore </a:t>
             </a:r>
           </a:p>
           <a:p>
@@ -10417,42 +10398,6 @@
           </a:p>
         </p:txBody>
       </p:sp>
-      <p:pic>
-        <p:nvPicPr>
-          <p:cNvPr id="4" name="Segnaposto contenuto 7" descr="reteJackson.png"/>
-          <p:cNvPicPr>
-            <a:picLocks noGrp="1" noChangeAspect="1"/>
-          </p:cNvPicPr>
-          <p:nvPr>
-            <p:ph idx="1"/>
-          </p:nvPr>
-        </p:nvPicPr>
-        <p:blipFill>
-          <a:blip r:embed="rId3"/>
-          <a:stretch>
-            <a:fillRect/>
-          </a:stretch>
-        </p:blipFill>
-        <p:spPr>
-          <a:xfrm>
-            <a:off x="0" y="818868"/>
-            <a:ext cx="12364439" cy="3155272"/>
-          </a:xfrm>
-          <a:prstGeom prst="rect">
-            <a:avLst/>
-          </a:prstGeom>
-          <a:ln>
-            <a:noFill/>
-          </a:ln>
-          <a:effectLst>
-            <a:outerShdw blurRad="292100" dist="139700" dir="2700000" algn="tl" rotWithShape="0">
-              <a:srgbClr val="333333">
-                <a:alpha val="65000"/>
-              </a:srgbClr>
-            </a:outerShdw>
-          </a:effectLst>
-        </p:spPr>
-      </p:pic>
       <p:graphicFrame>
         <p:nvGraphicFramePr>
           <p:cNvPr id="5" name="Oggetto 4"/>
@@ -10467,7 +10412,7 @@
         </p:xfrm>
         <a:graphic>
           <a:graphicData uri="http://schemas.openxmlformats.org/presentationml/2006/ole">
-            <p:oleObj spid="_x0000_s124930" name="Equazione" r:id="rId4" imgW="1193760" imgH="228600" progId="Equation.3">
+            <p:oleObj spid="_x0000_s124930" name="Equazione" r:id="rId3" imgW="1193760" imgH="228600" progId="Equation.3">
               <p:embed/>
             </p:oleObj>
           </a:graphicData>
@@ -10525,7 +10470,7 @@
         </p:xfrm>
         <a:graphic>
           <a:graphicData uri="http://schemas.openxmlformats.org/presentationml/2006/ole">
-            <p:oleObj spid="_x0000_s124931" name="Equazione" r:id="rId5" imgW="672840" imgH="228600" progId="Equation.3">
+            <p:oleObj spid="_x0000_s124931" name="Equazione" r:id="rId4" imgW="672840" imgH="228600" progId="Equation.3">
               <p:embed/>
             </p:oleObj>
           </a:graphicData>
@@ -10540,12 +10485,12 @@
           <p:nvPr/>
         </p:nvGraphicFramePr>
         <p:xfrm>
-          <a:off x="1062748" y="3995784"/>
-          <a:ext cx="8313264" cy="923696"/>
+          <a:off x="1006475" y="3995738"/>
+          <a:ext cx="8426450" cy="923925"/>
         </p:xfrm>
         <a:graphic>
           <a:graphicData uri="http://schemas.openxmlformats.org/presentationml/2006/ole">
-            <p:oleObj spid="_x0000_s124932" name="Equazione" r:id="rId6" imgW="3771720" imgH="419040" progId="Equation.3">
+            <p:oleObj spid="_x0000_s124932" name="Equazione" r:id="rId5" imgW="3822480" imgH="419040" progId="Equation.3">
               <p:embed/>
             </p:oleObj>
           </a:graphicData>
@@ -10565,12 +10510,35 @@
         </p:xfrm>
         <a:graphic>
           <a:graphicData uri="http://schemas.openxmlformats.org/presentationml/2006/ole">
-            <p:oleObj spid="_x0000_s124933" name="Equazione" r:id="rId7" imgW="4038480" imgH="393480" progId="Equation.3">
+            <p:oleObj spid="_x0000_s124933" name="Equazione" r:id="rId6" imgW="4038480" imgH="393480" progId="Equation.3">
               <p:embed/>
             </p:oleObj>
           </a:graphicData>
         </a:graphic>
       </p:graphicFrame>
+      <p:pic>
+        <p:nvPicPr>
+          <p:cNvPr id="15" name="Segnaposto contenuto 14" descr="reteJackson.png"/>
+          <p:cNvPicPr>
+            <a:picLocks noGrp="1" noChangeAspect="1"/>
+          </p:cNvPicPr>
+          <p:nvPr>
+            <p:ph idx="1"/>
+          </p:nvPr>
+        </p:nvPicPr>
+        <p:blipFill>
+          <a:blip r:embed="rId7"/>
+          <a:stretch>
+            <a:fillRect/>
+          </a:stretch>
+        </p:blipFill>
+        <p:spPr>
+          <a:xfrm>
+            <a:off x="329994" y="655089"/>
+            <a:ext cx="13049361" cy="3330057"/>
+          </a:xfrm>
+        </p:spPr>
+      </p:pic>
     </p:spTree>
   </p:cSld>
   <p:clrMapOvr>
@@ -10625,11 +10593,7 @@
           <a:p>
             <a:r>
               <a:rPr lang="it-IT" dirty="0" smtClean="0"/>
-              <a:t>Tempi di riposta del Sistema senza O.M</a:t>
-            </a:r>
-            <a:r>
-              <a:rPr lang="it-IT" dirty="0" smtClean="0"/>
-              <a:t>.</a:t>
+              <a:t>Tempi di riposta del Sistema senza O.M.</a:t>
             </a:r>
             <a:endParaRPr lang="it-IT" dirty="0"/>
           </a:p>
@@ -10803,11 +10767,7 @@
             </a:r>
             <a:r>
               <a:rPr lang="it-IT" dirty="0" err="1" smtClean="0"/>
-              <a:t>T</a:t>
-            </a:r>
-            <a:r>
-              <a:rPr lang="it-IT" dirty="0" err="1" smtClean="0"/>
-              <a:t>hroughput</a:t>
+              <a:t>Throughput</a:t>
             </a:r>
             <a:r>
               <a:rPr lang="it-IT" dirty="0" smtClean="0"/>
@@ -10912,52 +10872,7 @@
                 </a:solidFill>
                 <a:latin typeface="+mj-lt"/>
               </a:rPr>
-              <a:t>10 </a:t>
-            </a:r>
-            <a:r>
-              <a:rPr lang="de-DE" sz="2000" dirty="0" smtClean="0">
-                <a:solidFill>
-                  <a:schemeClr val="tx1"/>
-                </a:solidFill>
-                <a:latin typeface="+mj-lt"/>
-              </a:rPr>
-              <a:t>Erlang : [</a:t>
-            </a:r>
-            <a:r>
-              <a:rPr lang="de-DE" sz="2000" dirty="0" smtClean="0">
-                <a:solidFill>
-                  <a:schemeClr val="tx1"/>
-                </a:solidFill>
-                <a:latin typeface="+mj-lt"/>
-              </a:rPr>
-              <a:t>3,75592814</a:t>
-            </a:r>
-            <a:r>
-              <a:rPr lang="de-DE" sz="2000" dirty="0" smtClean="0">
-                <a:solidFill>
-                  <a:schemeClr val="tx1"/>
-                </a:solidFill>
-                <a:latin typeface="+mj-lt"/>
-              </a:rPr>
-              <a:t>; </a:t>
-            </a:r>
-            <a:r>
-              <a:rPr lang="de-DE" sz="2000" dirty="0" smtClean="0">
-                <a:solidFill>
-                  <a:schemeClr val="tx1"/>
-                </a:solidFill>
-                <a:latin typeface="+mj-lt"/>
-              </a:rPr>
-              <a:t>3,92657294</a:t>
-            </a:r>
-            <a:r>
-              <a:rPr lang="de-DE" sz="2000" dirty="0" smtClean="0">
-                <a:solidFill>
-                  <a:schemeClr val="tx1"/>
-                </a:solidFill>
-                <a:latin typeface="+mj-lt"/>
-              </a:rPr>
-              <a:t>]</a:t>
+              <a:t>10 Erlang : [3,75592814; 3,92657294]</a:t>
             </a:r>
           </a:p>
           <a:p>
@@ -10990,43 +10905,7 @@
                 </a:solidFill>
                 <a:latin typeface="+mj-lt"/>
               </a:rPr>
-              <a:t> : [</a:t>
-            </a:r>
-            <a:r>
-              <a:rPr lang="it-IT" sz="2000" dirty="0" smtClean="0">
-                <a:solidFill>
-                  <a:schemeClr val="tx1"/>
-                </a:solidFill>
-                <a:latin typeface="+mj-lt"/>
-              </a:rPr>
-              <a:t>0, </a:t>
-            </a:r>
-            <a:r>
-              <a:rPr lang="it-IT" sz="2000" dirty="0" smtClean="0">
-                <a:solidFill>
-                  <a:schemeClr val="tx1"/>
-                </a:solidFill>
-                <a:latin typeface="+mj-lt"/>
-              </a:rPr>
-              <a:t>84149673; </a:t>
-            </a:r>
-            <a:r>
-              <a:rPr lang="it-IT" sz="2000" dirty="0" smtClean="0">
-                <a:solidFill>
-                  <a:schemeClr val="tx1"/>
-                </a:solidFill>
-                <a:latin typeface="+mj-lt"/>
-              </a:rPr>
-              <a:t>0,87406350</a:t>
-            </a:r>
-            <a:r>
-              <a:rPr lang="it-IT" sz="2000" dirty="0" smtClean="0">
-                <a:solidFill>
-                  <a:schemeClr val="tx1"/>
-                </a:solidFill>
-                <a:latin typeface="+mj-lt"/>
-              </a:rPr>
-              <a:t>]</a:t>
+              <a:t> : [0, 84149673; 0,87406350]</a:t>
             </a:r>
             <a:endParaRPr lang="it-IT" sz="2000" dirty="0">
               <a:solidFill>
@@ -11430,15 +11309,7 @@
           <a:p>
             <a:r>
               <a:rPr lang="it-IT" dirty="0" smtClean="0"/>
-              <a:t>Tempi di riposta del Sistema </a:t>
-            </a:r>
-            <a:r>
-              <a:rPr lang="it-IT" dirty="0" smtClean="0"/>
-              <a:t>con </a:t>
-            </a:r>
-            <a:r>
-              <a:rPr lang="it-IT" dirty="0" smtClean="0"/>
-              <a:t>O.M.</a:t>
+              <a:t>Tempi di riposta del Sistema con O.M.</a:t>
             </a:r>
             <a:endParaRPr lang="it-IT" dirty="0"/>
           </a:p>
@@ -11533,11 +11404,7 @@
             </a:r>
             <a:r>
               <a:rPr lang="it-IT" dirty="0" smtClean="0"/>
-              <a:t> </a:t>
-            </a:r>
-            <a:r>
-              <a:rPr lang="it-IT" dirty="0" smtClean="0"/>
-              <a:t>con </a:t>
+              <a:t> con </a:t>
             </a:r>
             <a:r>
               <a:rPr lang="it-IT" dirty="0" err="1" smtClean="0"/>
@@ -12460,11 +12327,7 @@
             </a:pPr>
             <a:r>
               <a:rPr lang="it-IT" sz="2400" dirty="0" smtClean="0"/>
-              <a:t>Tempo medio di </a:t>
-            </a:r>
-            <a:r>
-              <a:rPr lang="it-IT" sz="2400" dirty="0" smtClean="0"/>
-              <a:t>risposta</a:t>
+              <a:t>Tempo medio di risposta</a:t>
             </a:r>
           </a:p>
           <a:p>
@@ -12508,7 +12371,7 @@
     </p:spTree>
     <p:extLst>
       <p:ext uri="{BB962C8B-B14F-4D97-AF65-F5344CB8AC3E}">
-        <p14:creationId xmlns:p14="http://schemas.microsoft.com/office/powerpoint/2010/main" xmlns="" val="2462797755"/>
+        <p14:creationId xmlns="" xmlns:p14="http://schemas.microsoft.com/office/powerpoint/2010/main" val="2462797755"/>
       </p:ext>
     </p:extLst>
   </p:cSld>
@@ -12516,7 +12379,7 @@
     <a:masterClrMapping/>
   </p:clrMapOvr>
   <mc:AlternateContent xmlns:mc="http://schemas.openxmlformats.org/markup-compatibility/2006">
-    <mc:Choice xmlns:p14="http://schemas.microsoft.com/office/powerpoint/2010/main" xmlns="" Requires="p14">
+    <mc:Choice xmlns="" xmlns:p14="http://schemas.microsoft.com/office/powerpoint/2010/main" Requires="p14">
       <p:transition spd="slow" p14:dur="1600">
         <p14:prism isContent="1" isInverted="1"/>
       </p:transition>
@@ -14120,14 +13983,14 @@
           </a:ln>
           <a:extLst>
             <a:ext uri="{909E8E84-426E-40DD-AFC4-6F175D3DCCD1}">
-              <a14:hiddenFill xmlns:a14="http://schemas.microsoft.com/office/drawing/2010/main" xmlns="">
+              <a14:hiddenFill xmlns="" xmlns:a14="http://schemas.microsoft.com/office/drawing/2010/main">
                 <a:solidFill>
                   <a:srgbClr val="FFFFFF"/>
                 </a:solidFill>
               </a14:hiddenFill>
             </a:ext>
             <a:ext uri="{91240B29-F687-4F45-9708-019B960494DF}">
-              <a14:hiddenLine xmlns:a14="http://schemas.microsoft.com/office/drawing/2010/main" xmlns="" w="9525">
+              <a14:hiddenLine xmlns="" xmlns:a14="http://schemas.microsoft.com/office/drawing/2010/main" w="9525">
                 <a:solidFill>
                   <a:srgbClr val="000000"/>
                 </a:solidFill>
@@ -14615,7 +14478,7 @@
     </p:spTree>
     <p:extLst>
       <p:ext uri="{BB962C8B-B14F-4D97-AF65-F5344CB8AC3E}">
-        <p14:creationId xmlns:p14="http://schemas.microsoft.com/office/powerpoint/2010/main" xmlns="" val="1429370702"/>
+        <p14:creationId xmlns="" xmlns:p14="http://schemas.microsoft.com/office/powerpoint/2010/main" val="1429370702"/>
       </p:ext>
     </p:extLst>
   </p:cSld>
@@ -15141,7 +15004,7 @@
     </p:spTree>
     <p:extLst>
       <p:ext uri="{BB962C8B-B14F-4D97-AF65-F5344CB8AC3E}">
-        <p14:creationId xmlns:p14="http://schemas.microsoft.com/office/powerpoint/2010/main" xmlns="" val="394784331"/>
+        <p14:creationId xmlns="" xmlns:p14="http://schemas.microsoft.com/office/powerpoint/2010/main" val="394784331"/>
       </p:ext>
     </p:extLst>
   </p:cSld>
@@ -15378,7 +15241,7 @@
     </p:spTree>
     <p:extLst>
       <p:ext uri="{BB962C8B-B14F-4D97-AF65-F5344CB8AC3E}">
-        <p14:creationId xmlns:p14="http://schemas.microsoft.com/office/powerpoint/2010/main" xmlns="" val="1174460167"/>
+        <p14:creationId xmlns="" xmlns:p14="http://schemas.microsoft.com/office/powerpoint/2010/main" val="1174460167"/>
       </p:ext>
     </p:extLst>
   </p:cSld>
@@ -15613,7 +15476,7 @@
     </p:spTree>
     <p:extLst>
       <p:ext uri="{BB962C8B-B14F-4D97-AF65-F5344CB8AC3E}">
-        <p14:creationId xmlns:p14="http://schemas.microsoft.com/office/powerpoint/2010/main" xmlns="" val="2568220349"/>
+        <p14:creationId xmlns="" xmlns:p14="http://schemas.microsoft.com/office/powerpoint/2010/main" val="2568220349"/>
       </p:ext>
     </p:extLst>
   </p:cSld>
@@ -15813,7 +15676,7 @@
       </p:sp>
       <p:pic>
         <p:nvPicPr>
-          <p:cNvPr id="5" name="Segnaposto contenuto 4" descr="CLIENT_Completion.png"/>
+          <p:cNvPr id="8" name="Segnaposto contenuto 7" descr="CLIENT_Completion.png"/>
           <p:cNvPicPr>
             <a:picLocks noGrp="1" noChangeAspect="1"/>
           </p:cNvPicPr>
@@ -15829,28 +15692,15 @@
         </p:blipFill>
         <p:spPr>
           <a:xfrm>
-            <a:off x="1519165" y="1228299"/>
-            <a:ext cx="9451453" cy="5629701"/>
+            <a:off x="1023582" y="1120260"/>
+            <a:ext cx="9632835" cy="5737740"/>
           </a:xfrm>
-          <a:prstGeom prst="rect">
-            <a:avLst/>
-          </a:prstGeom>
-          <a:ln>
-            <a:noFill/>
-          </a:ln>
-          <a:effectLst>
-            <a:outerShdw blurRad="292100" dist="139700" dir="2700000" algn="tl" rotWithShape="0">
-              <a:srgbClr val="333333">
-                <a:alpha val="65000"/>
-              </a:srgbClr>
-            </a:outerShdw>
-          </a:effectLst>
         </p:spPr>
       </p:pic>
     </p:spTree>
     <p:extLst>
       <p:ext uri="{BB962C8B-B14F-4D97-AF65-F5344CB8AC3E}">
-        <p14:creationId xmlns:p14="http://schemas.microsoft.com/office/powerpoint/2010/main" xmlns="" val="553473248"/>
+        <p14:creationId xmlns="" xmlns:p14="http://schemas.microsoft.com/office/powerpoint/2010/main" val="553473248"/>
       </p:ext>
     </p:extLst>
   </p:cSld>
@@ -15863,124 +15713,7 @@
   <p:timing>
     <p:tnLst>
       <p:par>
-        <p:cTn id="1" dur="indefinite" restart="never" nodeType="tmRoot">
-          <p:childTnLst>
-            <p:seq concurrent="1" nextAc="seek">
-              <p:cTn id="2" dur="indefinite" nodeType="mainSeq">
-                <p:childTnLst>
-                  <p:par>
-                    <p:cTn id="3" fill="hold">
-                      <p:stCondLst>
-                        <p:cond delay="indefinite"/>
-                        <p:cond evt="onBegin" delay="0">
-                          <p:tn val="2"/>
-                        </p:cond>
-                      </p:stCondLst>
-                      <p:childTnLst>
-                        <p:par>
-                          <p:cTn id="4" fill="hold">
-                            <p:stCondLst>
-                              <p:cond delay="0"/>
-                            </p:stCondLst>
-                            <p:childTnLst>
-                              <p:par>
-                                <p:cTn id="5" presetID="2" presetClass="entr" presetSubtype="4" fill="hold" nodeType="withEffect">
-                                  <p:stCondLst>
-                                    <p:cond delay="0"/>
-                                  </p:stCondLst>
-                                  <p:childTnLst>
-                                    <p:set>
-                                      <p:cBhvr>
-                                        <p:cTn id="6" dur="1" fill="hold">
-                                          <p:stCondLst>
-                                            <p:cond delay="0"/>
-                                          </p:stCondLst>
-                                        </p:cTn>
-                                        <p:tgtEl>
-                                          <p:spTgt spid="5"/>
-                                        </p:tgtEl>
-                                        <p:attrNameLst>
-                                          <p:attrName>style.visibility</p:attrName>
-                                        </p:attrNameLst>
-                                      </p:cBhvr>
-                                      <p:to>
-                                        <p:strVal val="visible"/>
-                                      </p:to>
-                                    </p:set>
-                                    <p:anim calcmode="lin" valueType="num">
-                                      <p:cBhvr additive="base">
-                                        <p:cTn id="7" dur="500" fill="hold"/>
-                                        <p:tgtEl>
-                                          <p:spTgt spid="5"/>
-                                        </p:tgtEl>
-                                        <p:attrNameLst>
-                                          <p:attrName>ppt_x</p:attrName>
-                                        </p:attrNameLst>
-                                      </p:cBhvr>
-                                      <p:tavLst>
-                                        <p:tav tm="0">
-                                          <p:val>
-                                            <p:strVal val="#ppt_x"/>
-                                          </p:val>
-                                        </p:tav>
-                                        <p:tav tm="100000">
-                                          <p:val>
-                                            <p:strVal val="#ppt_x"/>
-                                          </p:val>
-                                        </p:tav>
-                                      </p:tavLst>
-                                    </p:anim>
-                                    <p:anim calcmode="lin" valueType="num">
-                                      <p:cBhvr additive="base">
-                                        <p:cTn id="8" dur="500" fill="hold"/>
-                                        <p:tgtEl>
-                                          <p:spTgt spid="5"/>
-                                        </p:tgtEl>
-                                        <p:attrNameLst>
-                                          <p:attrName>ppt_y</p:attrName>
-                                        </p:attrNameLst>
-                                      </p:cBhvr>
-                                      <p:tavLst>
-                                        <p:tav tm="0">
-                                          <p:val>
-                                            <p:strVal val="1+#ppt_h/2"/>
-                                          </p:val>
-                                        </p:tav>
-                                        <p:tav tm="100000">
-                                          <p:val>
-                                            <p:strVal val="#ppt_y"/>
-                                          </p:val>
-                                        </p:tav>
-                                      </p:tavLst>
-                                    </p:anim>
-                                  </p:childTnLst>
-                                </p:cTn>
-                              </p:par>
-                            </p:childTnLst>
-                          </p:cTn>
-                        </p:par>
-                      </p:childTnLst>
-                    </p:cTn>
-                  </p:par>
-                </p:childTnLst>
-              </p:cTn>
-              <p:prevCondLst>
-                <p:cond evt="onPrev" delay="0">
-                  <p:tgtEl>
-                    <p:sldTgt/>
-                  </p:tgtEl>
-                </p:cond>
-              </p:prevCondLst>
-              <p:nextCondLst>
-                <p:cond evt="onNext" delay="0">
-                  <p:tgtEl>
-                    <p:sldTgt/>
-                  </p:tgtEl>
-                </p:cond>
-              </p:nextCondLst>
-            </p:seq>
-          </p:childTnLst>
-        </p:cTn>
+        <p:cTn id="1" dur="indefinite" restart="never" nodeType="tmRoot"/>
       </p:par>
     </p:tnLst>
   </p:timing>
@@ -16529,7 +16262,7 @@
   <a:extraClrSchemeLst/>
   <a:extLst>
     <a:ext uri="{05A4C25C-085E-4340-85A3-A5531E510DB2}">
-      <thm15:themeFamily xmlns:thm15="http://schemas.microsoft.com/office/thememl/2012/main" xmlns="" name="Office Theme" id="{62F939B6-93AF-4DB8-9C6B-D6C7DFDC589F}" vid="{4A3C46E8-61CC-4603-A589-7422A47A8E4A}"/>
+      <thm15:themeFamily xmlns="" xmlns:thm15="http://schemas.microsoft.com/office/thememl/2012/main" name="Office Theme" id="{62F939B6-93AF-4DB8-9C6B-D6C7DFDC589F}" vid="{4A3C46E8-61CC-4603-A589-7422A47A8E4A}"/>
     </a:ext>
   </a:extLst>
 </a:theme>

</xml_diff>